<commit_message>
arrays upd and phrasing
</commit_message>
<xml_diff>
--- a/src/ppt3.pptx
+++ b/src/ppt3.pptx
@@ -117,7 +117,7 @@
   </p:defaultTextStyle>
   <p:extLst>
     <p:ext uri="{EFAFB233-063F-42B5-8137-9DF3F51BA10A}">
-      <p15:sldGuideLst xmlns:p15="http://schemas.microsoft.com/office/powerpoint/2012/main" xmlns=""/>
+      <p15:sldGuideLst xmlns="" xmlns:p15="http://schemas.microsoft.com/office/powerpoint/2012/main"/>
     </p:ext>
   </p:extLst>
 </p:presentation>
@@ -846,7 +846,7 @@
             <a:fld id="{48A87A34-81AB-432B-8DAE-1953F412C126}" type="datetimeFigureOut">
               <a:rPr lang="en-US" smtClean="0"/>
               <a:pPr/>
-              <a:t>8/30/2017</a:t>
+              <a:t>9/6/2017</a:t>
             </a:fld>
             <a:endParaRPr lang="en-US" dirty="0"/>
           </a:p>
@@ -898,7 +898,7 @@
     </p:spTree>
     <p:extLst>
       <p:ext uri="{BB962C8B-B14F-4D97-AF65-F5344CB8AC3E}">
-        <p14:creationId xmlns:p14="http://schemas.microsoft.com/office/powerpoint/2010/main" xmlns="" val="2379700270"/>
+        <p14:creationId xmlns="" xmlns:p14="http://schemas.microsoft.com/office/powerpoint/2010/main" val="2379700270"/>
       </p:ext>
     </p:extLst>
   </p:cSld>
@@ -1099,7 +1099,7 @@
             <a:fld id="{48A87A34-81AB-432B-8DAE-1953F412C126}" type="datetimeFigureOut">
               <a:rPr lang="en-US" smtClean="0"/>
               <a:pPr/>
-              <a:t>8/30/2017</a:t>
+              <a:t>9/6/2017</a:t>
             </a:fld>
             <a:endParaRPr lang="en-US" dirty="0"/>
           </a:p>
@@ -1151,7 +1151,7 @@
     </p:spTree>
     <p:extLst>
       <p:ext uri="{BB962C8B-B14F-4D97-AF65-F5344CB8AC3E}">
-        <p14:creationId xmlns:p14="http://schemas.microsoft.com/office/powerpoint/2010/main" xmlns="" val="1804991245"/>
+        <p14:creationId xmlns="" xmlns:p14="http://schemas.microsoft.com/office/powerpoint/2010/main" val="1804991245"/>
       </p:ext>
     </p:extLst>
   </p:cSld>
@@ -1415,7 +1415,7 @@
             <a:fld id="{48A87A34-81AB-432B-8DAE-1953F412C126}" type="datetimeFigureOut">
               <a:rPr lang="en-US" smtClean="0"/>
               <a:pPr/>
-              <a:t>8/30/2017</a:t>
+              <a:t>9/6/2017</a:t>
             </a:fld>
             <a:endParaRPr lang="en-US" dirty="0"/>
           </a:p>
@@ -1557,7 +1557,7 @@
     </p:spTree>
     <p:extLst>
       <p:ext uri="{BB962C8B-B14F-4D97-AF65-F5344CB8AC3E}">
-        <p14:creationId xmlns:p14="http://schemas.microsoft.com/office/powerpoint/2010/main" xmlns="" val="1473712570"/>
+        <p14:creationId xmlns="" xmlns:p14="http://schemas.microsoft.com/office/powerpoint/2010/main" val="1473712570"/>
       </p:ext>
     </p:extLst>
   </p:cSld>
@@ -1758,7 +1758,7 @@
             <a:fld id="{48A87A34-81AB-432B-8DAE-1953F412C126}" type="datetimeFigureOut">
               <a:rPr lang="en-US" smtClean="0"/>
               <a:pPr/>
-              <a:t>8/30/2017</a:t>
+              <a:t>9/6/2017</a:t>
             </a:fld>
             <a:endParaRPr lang="en-US" dirty="0"/>
           </a:p>
@@ -1810,7 +1810,7 @@
     </p:spTree>
     <p:extLst>
       <p:ext uri="{BB962C8B-B14F-4D97-AF65-F5344CB8AC3E}">
-        <p14:creationId xmlns:p14="http://schemas.microsoft.com/office/powerpoint/2010/main" xmlns="" val="2530574234"/>
+        <p14:creationId xmlns="" xmlns:p14="http://schemas.microsoft.com/office/powerpoint/2010/main" val="2530574234"/>
       </p:ext>
     </p:extLst>
   </p:cSld>
@@ -2074,7 +2074,7 @@
             <a:fld id="{48A87A34-81AB-432B-8DAE-1953F412C126}" type="datetimeFigureOut">
               <a:rPr lang="en-US" smtClean="0"/>
               <a:pPr/>
-              <a:t>8/30/2017</a:t>
+              <a:t>9/6/2017</a:t>
             </a:fld>
             <a:endParaRPr lang="en-US" dirty="0"/>
           </a:p>
@@ -2208,7 +2208,7 @@
     </p:spTree>
     <p:extLst>
       <p:ext uri="{BB962C8B-B14F-4D97-AF65-F5344CB8AC3E}">
-        <p14:creationId xmlns:p14="http://schemas.microsoft.com/office/powerpoint/2010/main" xmlns="" val="1004790222"/>
+        <p14:creationId xmlns="" xmlns:p14="http://schemas.microsoft.com/office/powerpoint/2010/main" val="1004790222"/>
       </p:ext>
     </p:extLst>
   </p:cSld>
@@ -2469,7 +2469,7 @@
             <a:fld id="{48A87A34-81AB-432B-8DAE-1953F412C126}" type="datetimeFigureOut">
               <a:rPr lang="en-US" smtClean="0"/>
               <a:pPr/>
-              <a:t>8/30/2017</a:t>
+              <a:t>9/6/2017</a:t>
             </a:fld>
             <a:endParaRPr lang="en-US" dirty="0"/>
           </a:p>
@@ -2521,7 +2521,7 @@
     </p:spTree>
     <p:extLst>
       <p:ext uri="{BB962C8B-B14F-4D97-AF65-F5344CB8AC3E}">
-        <p14:creationId xmlns:p14="http://schemas.microsoft.com/office/powerpoint/2010/main" xmlns="" val="3328784466"/>
+        <p14:creationId xmlns="" xmlns:p14="http://schemas.microsoft.com/office/powerpoint/2010/main" val="3328784466"/>
       </p:ext>
     </p:extLst>
   </p:cSld>
@@ -2641,7 +2641,7 @@
             <a:fld id="{48A87A34-81AB-432B-8DAE-1953F412C126}" type="datetimeFigureOut">
               <a:rPr lang="en-US" smtClean="0"/>
               <a:pPr/>
-              <a:t>8/30/2017</a:t>
+              <a:t>9/6/2017</a:t>
             </a:fld>
             <a:endParaRPr lang="en-US" dirty="0"/>
           </a:p>
@@ -2693,7 +2693,7 @@
     </p:spTree>
     <p:extLst>
       <p:ext uri="{BB962C8B-B14F-4D97-AF65-F5344CB8AC3E}">
-        <p14:creationId xmlns:p14="http://schemas.microsoft.com/office/powerpoint/2010/main" xmlns="" val="1447070425"/>
+        <p14:creationId xmlns="" xmlns:p14="http://schemas.microsoft.com/office/powerpoint/2010/main" val="1447070425"/>
       </p:ext>
     </p:extLst>
   </p:cSld>
@@ -2823,7 +2823,7 @@
             <a:fld id="{48A87A34-81AB-432B-8DAE-1953F412C126}" type="datetimeFigureOut">
               <a:rPr lang="en-US" smtClean="0"/>
               <a:pPr/>
-              <a:t>8/30/2017</a:t>
+              <a:t>9/6/2017</a:t>
             </a:fld>
             <a:endParaRPr lang="en-US" dirty="0"/>
           </a:p>
@@ -2875,7 +2875,7 @@
     </p:spTree>
     <p:extLst>
       <p:ext uri="{BB962C8B-B14F-4D97-AF65-F5344CB8AC3E}">
-        <p14:creationId xmlns:p14="http://schemas.microsoft.com/office/powerpoint/2010/main" xmlns="" val="3648480235"/>
+        <p14:creationId xmlns="" xmlns:p14="http://schemas.microsoft.com/office/powerpoint/2010/main" val="3648480235"/>
       </p:ext>
     </p:extLst>
   </p:cSld>
@@ -3001,7 +3001,7 @@
             <a:fld id="{48A87A34-81AB-432B-8DAE-1953F412C126}" type="datetimeFigureOut">
               <a:rPr lang="en-US" smtClean="0"/>
               <a:pPr/>
-              <a:t>8/30/2017</a:t>
+              <a:t>9/6/2017</a:t>
             </a:fld>
             <a:endParaRPr lang="en-US" dirty="0"/>
           </a:p>
@@ -3053,7 +3053,7 @@
     </p:spTree>
     <p:extLst>
       <p:ext uri="{BB962C8B-B14F-4D97-AF65-F5344CB8AC3E}">
-        <p14:creationId xmlns:p14="http://schemas.microsoft.com/office/powerpoint/2010/main" xmlns="" val="2649633687"/>
+        <p14:creationId xmlns="" xmlns:p14="http://schemas.microsoft.com/office/powerpoint/2010/main" val="2649633687"/>
       </p:ext>
     </p:extLst>
   </p:cSld>
@@ -3250,7 +3250,7 @@
             <a:fld id="{48A87A34-81AB-432B-8DAE-1953F412C126}" type="datetimeFigureOut">
               <a:rPr lang="en-US" smtClean="0"/>
               <a:pPr/>
-              <a:t>8/30/2017</a:t>
+              <a:t>9/6/2017</a:t>
             </a:fld>
             <a:endParaRPr lang="en-US" dirty="0"/>
           </a:p>
@@ -3302,7 +3302,7 @@
     </p:spTree>
     <p:extLst>
       <p:ext uri="{BB962C8B-B14F-4D97-AF65-F5344CB8AC3E}">
-        <p14:creationId xmlns:p14="http://schemas.microsoft.com/office/powerpoint/2010/main" xmlns="" val="572893903"/>
+        <p14:creationId xmlns="" xmlns:p14="http://schemas.microsoft.com/office/powerpoint/2010/main" val="572893903"/>
       </p:ext>
     </p:extLst>
   </p:cSld>
@@ -3484,7 +3484,7 @@
             <a:fld id="{48A87A34-81AB-432B-8DAE-1953F412C126}" type="datetimeFigureOut">
               <a:rPr lang="en-US" smtClean="0"/>
               <a:pPr/>
-              <a:t>8/30/2017</a:t>
+              <a:t>9/6/2017</a:t>
             </a:fld>
             <a:endParaRPr lang="en-US" dirty="0"/>
           </a:p>
@@ -3536,7 +3536,7 @@
     </p:spTree>
     <p:extLst>
       <p:ext uri="{BB962C8B-B14F-4D97-AF65-F5344CB8AC3E}">
-        <p14:creationId xmlns:p14="http://schemas.microsoft.com/office/powerpoint/2010/main" xmlns="" val="3918475607"/>
+        <p14:creationId xmlns="" xmlns:p14="http://schemas.microsoft.com/office/powerpoint/2010/main" val="3918475607"/>
       </p:ext>
     </p:extLst>
   </p:cSld>
@@ -3860,7 +3860,7 @@
             <a:fld id="{48A87A34-81AB-432B-8DAE-1953F412C126}" type="datetimeFigureOut">
               <a:rPr lang="en-US" smtClean="0"/>
               <a:pPr/>
-              <a:t>8/30/2017</a:t>
+              <a:t>9/6/2017</a:t>
             </a:fld>
             <a:endParaRPr lang="en-US" dirty="0"/>
           </a:p>
@@ -3912,7 +3912,7 @@
     </p:spTree>
     <p:extLst>
       <p:ext uri="{BB962C8B-B14F-4D97-AF65-F5344CB8AC3E}">
-        <p14:creationId xmlns:p14="http://schemas.microsoft.com/office/powerpoint/2010/main" xmlns="" val="70569158"/>
+        <p14:creationId xmlns="" xmlns:p14="http://schemas.microsoft.com/office/powerpoint/2010/main" val="70569158"/>
       </p:ext>
     </p:extLst>
   </p:cSld>
@@ -3985,7 +3985,7 @@
             <a:fld id="{48A87A34-81AB-432B-8DAE-1953F412C126}" type="datetimeFigureOut">
               <a:rPr lang="en-US" smtClean="0"/>
               <a:pPr/>
-              <a:t>8/30/2017</a:t>
+              <a:t>9/6/2017</a:t>
             </a:fld>
             <a:endParaRPr lang="en-US" dirty="0"/>
           </a:p>
@@ -4037,7 +4037,7 @@
     </p:spTree>
     <p:extLst>
       <p:ext uri="{BB962C8B-B14F-4D97-AF65-F5344CB8AC3E}">
-        <p14:creationId xmlns:p14="http://schemas.microsoft.com/office/powerpoint/2010/main" xmlns="" val="3956773614"/>
+        <p14:creationId xmlns="" xmlns:p14="http://schemas.microsoft.com/office/powerpoint/2010/main" val="3956773614"/>
       </p:ext>
     </p:extLst>
   </p:cSld>
@@ -4082,7 +4082,7 @@
             <a:fld id="{48A87A34-81AB-432B-8DAE-1953F412C126}" type="datetimeFigureOut">
               <a:rPr lang="en-US" smtClean="0"/>
               <a:pPr/>
-              <a:t>8/30/2017</a:t>
+              <a:t>9/6/2017</a:t>
             </a:fld>
             <a:endParaRPr lang="en-US" dirty="0"/>
           </a:p>
@@ -4134,7 +4134,7 @@
     </p:spTree>
     <p:extLst>
       <p:ext uri="{BB962C8B-B14F-4D97-AF65-F5344CB8AC3E}">
-        <p14:creationId xmlns:p14="http://schemas.microsoft.com/office/powerpoint/2010/main" xmlns="" val="843387325"/>
+        <p14:creationId xmlns="" xmlns:p14="http://schemas.microsoft.com/office/powerpoint/2010/main" val="843387325"/>
       </p:ext>
     </p:extLst>
   </p:cSld>
@@ -4339,7 +4339,7 @@
             <a:fld id="{48A87A34-81AB-432B-8DAE-1953F412C126}" type="datetimeFigureOut">
               <a:rPr lang="en-US" smtClean="0"/>
               <a:pPr/>
-              <a:t>8/30/2017</a:t>
+              <a:t>9/6/2017</a:t>
             </a:fld>
             <a:endParaRPr lang="en-US" dirty="0"/>
           </a:p>
@@ -4391,7 +4391,7 @@
     </p:spTree>
     <p:extLst>
       <p:ext uri="{BB962C8B-B14F-4D97-AF65-F5344CB8AC3E}">
-        <p14:creationId xmlns:p14="http://schemas.microsoft.com/office/powerpoint/2010/main" xmlns="" val="614752468"/>
+        <p14:creationId xmlns="" xmlns:p14="http://schemas.microsoft.com/office/powerpoint/2010/main" val="614752468"/>
       </p:ext>
     </p:extLst>
   </p:cSld>
@@ -4604,7 +4604,7 @@
             <a:fld id="{48A87A34-81AB-432B-8DAE-1953F412C126}" type="datetimeFigureOut">
               <a:rPr lang="en-US" smtClean="0"/>
               <a:pPr/>
-              <a:t>8/30/2017</a:t>
+              <a:t>9/6/2017</a:t>
             </a:fld>
             <a:endParaRPr lang="en-US" dirty="0"/>
           </a:p>
@@ -4656,7 +4656,7 @@
     </p:spTree>
     <p:extLst>
       <p:ext uri="{BB962C8B-B14F-4D97-AF65-F5344CB8AC3E}">
-        <p14:creationId xmlns:p14="http://schemas.microsoft.com/office/powerpoint/2010/main" xmlns="" val="2525773852"/>
+        <p14:creationId xmlns="" xmlns:p14="http://schemas.microsoft.com/office/powerpoint/2010/main" val="2525773852"/>
       </p:ext>
     </p:extLst>
   </p:cSld>
@@ -5349,7 +5349,7 @@
             <a:fld id="{48A87A34-81AB-432B-8DAE-1953F412C126}" type="datetimeFigureOut">
               <a:rPr lang="en-US" smtClean="0"/>
               <a:pPr/>
-              <a:t>8/30/2017</a:t>
+              <a:t>9/6/2017</a:t>
             </a:fld>
             <a:endParaRPr lang="en-US" dirty="0"/>
           </a:p>
@@ -5435,7 +5435,7 @@
     </p:spTree>
     <p:extLst>
       <p:ext uri="{BB962C8B-B14F-4D97-AF65-F5344CB8AC3E}">
-        <p14:creationId xmlns:p14="http://schemas.microsoft.com/office/powerpoint/2010/main" xmlns="" val="2849168193"/>
+        <p14:creationId xmlns="" xmlns:p14="http://schemas.microsoft.com/office/powerpoint/2010/main" val="2849168193"/>
       </p:ext>
     </p:extLst>
   </p:cSld>
@@ -5921,7 +5921,7 @@
     </p:spTree>
     <p:extLst>
       <p:ext uri="{BB962C8B-B14F-4D97-AF65-F5344CB8AC3E}">
-        <p14:creationId xmlns:p14="http://schemas.microsoft.com/office/powerpoint/2010/main" xmlns="" val="1597654807"/>
+        <p14:creationId xmlns="" xmlns:p14="http://schemas.microsoft.com/office/powerpoint/2010/main" val="1597654807"/>
       </p:ext>
     </p:extLst>
   </p:cSld>
@@ -6069,7 +6069,7 @@
     </p:spTree>
     <p:extLst>
       <p:ext uri="{BB962C8B-B14F-4D97-AF65-F5344CB8AC3E}">
-        <p14:creationId xmlns:p14="http://schemas.microsoft.com/office/powerpoint/2010/main" xmlns="" val="999608912"/>
+        <p14:creationId xmlns="" xmlns:p14="http://schemas.microsoft.com/office/powerpoint/2010/main" val="999608912"/>
       </p:ext>
     </p:extLst>
   </p:cSld>
@@ -6209,7 +6209,7 @@
     </p:spTree>
     <p:extLst>
       <p:ext uri="{BB962C8B-B14F-4D97-AF65-F5344CB8AC3E}">
-        <p14:creationId xmlns:p14="http://schemas.microsoft.com/office/powerpoint/2010/main" xmlns="" val="999608912"/>
+        <p14:creationId xmlns="" xmlns:p14="http://schemas.microsoft.com/office/powerpoint/2010/main" val="999608912"/>
       </p:ext>
     </p:extLst>
   </p:cSld>
@@ -6305,11 +6305,7 @@
             <a:pPr marL="609600" indent="-609600"/>
             <a:r>
               <a:rPr lang="he-IL" sz="4800" dirty="0" smtClean="0"/>
-              <a:t>סידור </a:t>
-            </a:r>
-            <a:r>
-              <a:rPr lang="he-IL" sz="4800" dirty="0" smtClean="0"/>
-              <a:t>ציוד ועמדת העבודה</a:t>
+              <a:t>סידור ציוד ועמדת העבודה</a:t>
             </a:r>
           </a:p>
           <a:p>
@@ -6328,7 +6324,7 @@
     </p:spTree>
     <p:extLst>
       <p:ext uri="{BB962C8B-B14F-4D97-AF65-F5344CB8AC3E}">
-        <p14:creationId xmlns="" xmlns:p14="http://schemas.microsoft.com/office/powerpoint/2010/main" val="2508929371"/>
+        <p14:creationId xmlns:p14="http://schemas.microsoft.com/office/powerpoint/2010/main" xmlns="" val="2508929371"/>
       </p:ext>
     </p:extLst>
   </p:cSld>
@@ -6406,7 +6402,7 @@
         </p:spPr>
         <p:txBody>
           <a:bodyPr>
-            <a:normAutofit/>
+            <a:normAutofit lnSpcReduction="10000"/>
           </a:bodyPr>
           <a:lstStyle/>
           <a:p>
@@ -6418,8 +6414,16 @@
           <a:p>
             <a:r>
               <a:rPr lang="he-IL" sz="4000" dirty="0" smtClean="0"/>
-              <a:t> חיבור הרובוט למחשב</a:t>
-            </a:r>
+              <a:t> לתת הוראות לרובוט</a:t>
+            </a:r>
+          </a:p>
+          <a:p>
+            <a:pPr lvl="1"/>
+            <a:r>
+              <a:rPr lang="he-IL" sz="3600" dirty="0" smtClean="0"/>
+              <a:t> תרגיל – המורה הוא רובוט</a:t>
+            </a:r>
+            <a:endParaRPr lang="he-IL" sz="3600" dirty="0" smtClean="0"/>
           </a:p>
           <a:p>
             <a:r>
@@ -6433,21 +6437,35 @@
             <a:endParaRPr lang="he-IL" sz="4000" dirty="0" smtClean="0"/>
           </a:p>
           <a:p>
+            <a:pPr lvl="1"/>
+            <a:r>
+              <a:rPr lang="he-IL" sz="3800" dirty="0" smtClean="0"/>
+              <a:t> </a:t>
+            </a:r>
+            <a:r>
+              <a:rPr lang="he-IL" sz="3800" dirty="0" smtClean="0"/>
+              <a:t>היכרות עם הסביבה</a:t>
+            </a:r>
+          </a:p>
+          <a:p>
+            <a:pPr lvl="1"/>
+            <a:r>
+              <a:rPr lang="he-IL" sz="3800" dirty="0" smtClean="0"/>
+              <a:t> </a:t>
+            </a:r>
+            <a:r>
+              <a:rPr lang="he-IL" sz="3800" dirty="0" smtClean="0"/>
+              <a:t>היכרות עם סוגי פקודות</a:t>
+            </a:r>
+          </a:p>
+          <a:p>
             <a:r>
               <a:rPr lang="he-IL" sz="4000" dirty="0" smtClean="0"/>
-              <a:t> תכנות הרובוט - צלילים</a:t>
-            </a:r>
-          </a:p>
-          <a:p>
+              <a:t> סדר </a:t>
+            </a:r>
             <a:r>
               <a:rPr lang="he-IL" sz="4000" dirty="0" smtClean="0"/>
-              <a:t> תכנות הרובוט – מנועים</a:t>
-            </a:r>
-          </a:p>
-          <a:p>
-            <a:r>
-              <a:rPr lang="he-IL" sz="4000" dirty="0" smtClean="0"/>
-              <a:t>סדר וניקיון</a:t>
+              <a:t>וניקיון</a:t>
             </a:r>
           </a:p>
           <a:p>
@@ -6461,7 +6479,7 @@
     </p:spTree>
     <p:extLst>
       <p:ext uri="{BB962C8B-B14F-4D97-AF65-F5344CB8AC3E}">
-        <p14:creationId xmlns:p14="http://schemas.microsoft.com/office/powerpoint/2010/main" xmlns="" val="2508929371"/>
+        <p14:creationId xmlns="" xmlns:p14="http://schemas.microsoft.com/office/powerpoint/2010/main" val="2508929371"/>
       </p:ext>
     </p:extLst>
   </p:cSld>
@@ -6571,7 +6589,7 @@
     </p:spTree>
     <p:extLst>
       <p:ext uri="{BB962C8B-B14F-4D97-AF65-F5344CB8AC3E}">
-        <p14:creationId xmlns:p14="http://schemas.microsoft.com/office/powerpoint/2010/main" xmlns="" val="2508929371"/>
+        <p14:creationId xmlns="" xmlns:p14="http://schemas.microsoft.com/office/powerpoint/2010/main" val="2508929371"/>
       </p:ext>
     </p:extLst>
   </p:cSld>
@@ -6625,7 +6643,7 @@
             <a:pPr algn="r"/>
             <a:r>
               <a:rPr lang="he-IL" sz="4400" b="1" dirty="0" smtClean="0"/>
-              <a:t>תרגיל – המורה הוא רובוט!</a:t>
+              <a:t>לתת הוראות לרובוט</a:t>
             </a:r>
             <a:endParaRPr lang="he-IL" sz="4400" b="1" dirty="0"/>
           </a:p>
@@ -6655,7 +6673,11 @@
           <a:p>
             <a:r>
               <a:rPr lang="he-IL" sz="3600" dirty="0" smtClean="0"/>
-              <a:t>המורה הוא רובוט!</a:t>
+              <a:t> תרגיל - המורה </a:t>
+            </a:r>
+            <a:r>
+              <a:rPr lang="he-IL" sz="3600" dirty="0" smtClean="0"/>
+              <a:t>הוא רובוט!</a:t>
             </a:r>
           </a:p>
           <a:p>
@@ -6705,7 +6727,7 @@
     </p:spTree>
     <p:extLst>
       <p:ext uri="{BB962C8B-B14F-4D97-AF65-F5344CB8AC3E}">
-        <p14:creationId xmlns:p14="http://schemas.microsoft.com/office/powerpoint/2010/main" xmlns="" val="2508929371"/>
+        <p14:creationId xmlns="" xmlns:p14="http://schemas.microsoft.com/office/powerpoint/2010/main" val="2508929371"/>
       </p:ext>
     </p:extLst>
   </p:cSld>
@@ -6823,7 +6845,7 @@
     </p:spTree>
     <p:extLst>
       <p:ext uri="{BB962C8B-B14F-4D97-AF65-F5344CB8AC3E}">
-        <p14:creationId xmlns:p14="http://schemas.microsoft.com/office/powerpoint/2010/main" xmlns="" val="2508929371"/>
+        <p14:creationId xmlns="" xmlns:p14="http://schemas.microsoft.com/office/powerpoint/2010/main" val="2508929371"/>
       </p:ext>
     </p:extLst>
   </p:cSld>
@@ -6955,7 +6977,7 @@
     </p:spTree>
     <p:extLst>
       <p:ext uri="{BB962C8B-B14F-4D97-AF65-F5344CB8AC3E}">
-        <p14:creationId xmlns:p14="http://schemas.microsoft.com/office/powerpoint/2010/main" xmlns="" val="999608912"/>
+        <p14:creationId xmlns="" xmlns:p14="http://schemas.microsoft.com/office/powerpoint/2010/main" val="999608912"/>
       </p:ext>
     </p:extLst>
   </p:cSld>
@@ -7050,7 +7072,7 @@
     </p:spTree>
     <p:extLst>
       <p:ext uri="{BB962C8B-B14F-4D97-AF65-F5344CB8AC3E}">
-        <p14:creationId xmlns:p14="http://schemas.microsoft.com/office/powerpoint/2010/main" xmlns="" val="999608912"/>
+        <p14:creationId xmlns="" xmlns:p14="http://schemas.microsoft.com/office/powerpoint/2010/main" val="999608912"/>
       </p:ext>
     </p:extLst>
   </p:cSld>
@@ -7145,7 +7167,7 @@
     </p:spTree>
     <p:extLst>
       <p:ext uri="{BB962C8B-B14F-4D97-AF65-F5344CB8AC3E}">
-        <p14:creationId xmlns:p14="http://schemas.microsoft.com/office/powerpoint/2010/main" xmlns="" val="999608912"/>
+        <p14:creationId xmlns="" xmlns:p14="http://schemas.microsoft.com/office/powerpoint/2010/main" val="999608912"/>
       </p:ext>
     </p:extLst>
   </p:cSld>
@@ -7240,7 +7262,7 @@
     </p:spTree>
     <p:extLst>
       <p:ext uri="{BB962C8B-B14F-4D97-AF65-F5344CB8AC3E}">
-        <p14:creationId xmlns:p14="http://schemas.microsoft.com/office/powerpoint/2010/main" xmlns="" val="999608912"/>
+        <p14:creationId xmlns="" xmlns:p14="http://schemas.microsoft.com/office/powerpoint/2010/main" val="999608912"/>
       </p:ext>
     </p:extLst>
   </p:cSld>
@@ -7508,7 +7530,7 @@
   <a:extraClrSchemeLst/>
   <a:extLst>
     <a:ext uri="{05A4C25C-085E-4340-85A3-A5531E510DB2}">
-      <thm15:themeFamily xmlns:thm15="http://schemas.microsoft.com/office/thememl/2012/main" xmlns="" name="Facet" id="{C0C680CD-088A-49FC-A102-D699147F32B2}" vid="{CFBC31BA-B70F-4F30-BCAA-4F3011E16C4D}"/>
+      <thm15:themeFamily xmlns="" xmlns:thm15="http://schemas.microsoft.com/office/thememl/2012/main" name="Facet" id="{C0C680CD-088A-49FC-A102-D699147F32B2}" vid="{CFBC31BA-B70F-4F30-BCAA-4F3011E16C4D}"/>
     </a:ext>
   </a:extLst>
 </a:theme>

</xml_diff>